<commit_message>
DeveloperGuide.adoc: Update doc for Storage
</commit_message>
<xml_diff>
--- a/docs/diagrams/StorageComponentClassDiagram.pptx
+++ b/docs/diagrams/StorageComponentClassDiagram.pptx
@@ -107,6 +107,22 @@
       </a:defRPr>
     </a:lvl9pPr>
   </p:defaultTextStyle>
+  <p:extLst>
+    <p:ext uri="{EFAFB233-063F-42B5-8137-9DF3F51BA10A}">
+      <p15:sldGuideLst xmlns:p15="http://schemas.microsoft.com/office/powerpoint/2012/main">
+        <p15:guide id="1" orient="horz" pos="1488">
+          <p15:clr>
+            <a:srgbClr val="A4A3A4"/>
+          </p15:clr>
+        </p15:guide>
+        <p15:guide id="2" pos="2880">
+          <p15:clr>
+            <a:srgbClr val="A4A3A4"/>
+          </p15:clr>
+        </p15:guide>
+      </p15:sldGuideLst>
+    </p:ext>
+  </p:extLst>
 </p:presentation>
 </file>
 
@@ -192,7 +208,7 @@
           <a:p>
             <a:fld id="{F5CC4B3F-88C1-4FFA-B1B6-F41C21DC6924}" type="datetimeFigureOut">
               <a:rPr lang="en-US" smtClean="0"/>
-              <a:t>10/16/2016</a:t>
+              <a:t>10/17/2018</a:t>
             </a:fld>
             <a:endParaRPr lang="en-US"/>
           </a:p>
@@ -256,38 +272,37 @@
           <a:p>
             <a:pPr lvl="0"/>
             <a:r>
-              <a:rPr lang="en-US" smtClean="0"/>
+              <a:rPr lang="en-US"/>
               <a:t>Click to edit Master text styles</a:t>
             </a:r>
           </a:p>
           <a:p>
             <a:pPr lvl="1"/>
             <a:r>
-              <a:rPr lang="en-US" smtClean="0"/>
+              <a:rPr lang="en-US"/>
               <a:t>Second level</a:t>
             </a:r>
           </a:p>
           <a:p>
             <a:pPr lvl="2"/>
             <a:r>
-              <a:rPr lang="en-US" smtClean="0"/>
+              <a:rPr lang="en-US"/>
               <a:t>Third level</a:t>
             </a:r>
           </a:p>
           <a:p>
             <a:pPr lvl="3"/>
             <a:r>
-              <a:rPr lang="en-US" smtClean="0"/>
+              <a:rPr lang="en-US"/>
               <a:t>Fourth level</a:t>
             </a:r>
           </a:p>
           <a:p>
             <a:pPr lvl="4"/>
             <a:r>
-              <a:rPr lang="en-US" smtClean="0"/>
+              <a:rPr lang="en-US"/>
               <a:t>Fifth level</a:t>
             </a:r>
-            <a:endParaRPr lang="en-US"/>
           </a:p>
         </p:txBody>
       </p:sp>
@@ -498,10 +513,9 @@
           <a:lstStyle/>
           <a:p>
             <a:r>
-              <a:rPr lang="en-US" smtClean="0"/>
+              <a:rPr lang="en-US"/>
               <a:t>Click to edit Master title style</a:t>
             </a:r>
-            <a:endParaRPr lang="en-US"/>
           </a:p>
         </p:txBody>
       </p:sp>
@@ -617,10 +631,9 @@
           </a:lstStyle>
           <a:p>
             <a:r>
-              <a:rPr lang="en-US" smtClean="0"/>
+              <a:rPr lang="en-US"/>
               <a:t>Click to edit Master subtitle style</a:t>
             </a:r>
-            <a:endParaRPr lang="en-US"/>
           </a:p>
         </p:txBody>
       </p:sp>
@@ -641,7 +654,7 @@
           <a:p>
             <a:fld id="{78C97017-6FC3-485B-9764-EAC9E56C1D49}" type="datetimeFigureOut">
               <a:rPr lang="en-US" smtClean="0"/>
-              <a:t>10/16/2016</a:t>
+              <a:t>10/17/2018</a:t>
             </a:fld>
             <a:endParaRPr lang="en-US"/>
           </a:p>
@@ -735,10 +748,9 @@
           <a:lstStyle/>
           <a:p>
             <a:r>
-              <a:rPr lang="en-US" smtClean="0"/>
+              <a:rPr lang="en-US"/>
               <a:t>Click to edit Master title style</a:t>
             </a:r>
-            <a:endParaRPr lang="en-US"/>
           </a:p>
         </p:txBody>
       </p:sp>
@@ -759,38 +771,37 @@
           <a:p>
             <a:pPr lvl="0"/>
             <a:r>
-              <a:rPr lang="en-US" smtClean="0"/>
+              <a:rPr lang="en-US"/>
               <a:t>Click to edit Master text styles</a:t>
             </a:r>
           </a:p>
           <a:p>
             <a:pPr lvl="1"/>
             <a:r>
-              <a:rPr lang="en-US" smtClean="0"/>
+              <a:rPr lang="en-US"/>
               <a:t>Second level</a:t>
             </a:r>
           </a:p>
           <a:p>
             <a:pPr lvl="2"/>
             <a:r>
-              <a:rPr lang="en-US" smtClean="0"/>
+              <a:rPr lang="en-US"/>
               <a:t>Third level</a:t>
             </a:r>
           </a:p>
           <a:p>
             <a:pPr lvl="3"/>
             <a:r>
-              <a:rPr lang="en-US" smtClean="0"/>
+              <a:rPr lang="en-US"/>
               <a:t>Fourth level</a:t>
             </a:r>
           </a:p>
           <a:p>
             <a:pPr lvl="4"/>
             <a:r>
-              <a:rPr lang="en-US" smtClean="0"/>
+              <a:rPr lang="en-US"/>
               <a:t>Fifth level</a:t>
             </a:r>
-            <a:endParaRPr lang="en-US"/>
           </a:p>
         </p:txBody>
       </p:sp>
@@ -811,7 +822,7 @@
           <a:p>
             <a:fld id="{78C97017-6FC3-485B-9764-EAC9E56C1D49}" type="datetimeFigureOut">
               <a:rPr lang="en-US" smtClean="0"/>
-              <a:t>10/16/2016</a:t>
+              <a:t>10/17/2018</a:t>
             </a:fld>
             <a:endParaRPr lang="en-US"/>
           </a:p>
@@ -910,10 +921,9 @@
           <a:lstStyle/>
           <a:p>
             <a:r>
-              <a:rPr lang="en-US" smtClean="0"/>
+              <a:rPr lang="en-US"/>
               <a:t>Click to edit Master title style</a:t>
             </a:r>
-            <a:endParaRPr lang="en-US"/>
           </a:p>
         </p:txBody>
       </p:sp>
@@ -939,38 +949,37 @@
           <a:p>
             <a:pPr lvl="0"/>
             <a:r>
-              <a:rPr lang="en-US" smtClean="0"/>
+              <a:rPr lang="en-US"/>
               <a:t>Click to edit Master text styles</a:t>
             </a:r>
           </a:p>
           <a:p>
             <a:pPr lvl="1"/>
             <a:r>
-              <a:rPr lang="en-US" smtClean="0"/>
+              <a:rPr lang="en-US"/>
               <a:t>Second level</a:t>
             </a:r>
           </a:p>
           <a:p>
             <a:pPr lvl="2"/>
             <a:r>
-              <a:rPr lang="en-US" smtClean="0"/>
+              <a:rPr lang="en-US"/>
               <a:t>Third level</a:t>
             </a:r>
           </a:p>
           <a:p>
             <a:pPr lvl="3"/>
             <a:r>
-              <a:rPr lang="en-US" smtClean="0"/>
+              <a:rPr lang="en-US"/>
               <a:t>Fourth level</a:t>
             </a:r>
           </a:p>
           <a:p>
             <a:pPr lvl="4"/>
             <a:r>
-              <a:rPr lang="en-US" smtClean="0"/>
+              <a:rPr lang="en-US"/>
               <a:t>Fifth level</a:t>
             </a:r>
-            <a:endParaRPr lang="en-US"/>
           </a:p>
         </p:txBody>
       </p:sp>
@@ -991,7 +1000,7 @@
           <a:p>
             <a:fld id="{78C97017-6FC3-485B-9764-EAC9E56C1D49}" type="datetimeFigureOut">
               <a:rPr lang="en-US" smtClean="0"/>
-              <a:t>10/16/2016</a:t>
+              <a:t>10/17/2018</a:t>
             </a:fld>
             <a:endParaRPr lang="en-US"/>
           </a:p>
@@ -1085,10 +1094,9 @@
           <a:lstStyle/>
           <a:p>
             <a:r>
-              <a:rPr lang="en-US" smtClean="0"/>
+              <a:rPr lang="en-US"/>
               <a:t>Click to edit Master title style</a:t>
             </a:r>
-            <a:endParaRPr lang="en-US"/>
           </a:p>
         </p:txBody>
       </p:sp>
@@ -1109,38 +1117,37 @@
           <a:p>
             <a:pPr lvl="0"/>
             <a:r>
-              <a:rPr lang="en-US" smtClean="0"/>
+              <a:rPr lang="en-US"/>
               <a:t>Click to edit Master text styles</a:t>
             </a:r>
           </a:p>
           <a:p>
             <a:pPr lvl="1"/>
             <a:r>
-              <a:rPr lang="en-US" smtClean="0"/>
+              <a:rPr lang="en-US"/>
               <a:t>Second level</a:t>
             </a:r>
           </a:p>
           <a:p>
             <a:pPr lvl="2"/>
             <a:r>
-              <a:rPr lang="en-US" smtClean="0"/>
+              <a:rPr lang="en-US"/>
               <a:t>Third level</a:t>
             </a:r>
           </a:p>
           <a:p>
             <a:pPr lvl="3"/>
             <a:r>
-              <a:rPr lang="en-US" smtClean="0"/>
+              <a:rPr lang="en-US"/>
               <a:t>Fourth level</a:t>
             </a:r>
           </a:p>
           <a:p>
             <a:pPr lvl="4"/>
             <a:r>
-              <a:rPr lang="en-US" smtClean="0"/>
+              <a:rPr lang="en-US"/>
               <a:t>Fifth level</a:t>
             </a:r>
-            <a:endParaRPr lang="en-US"/>
           </a:p>
         </p:txBody>
       </p:sp>
@@ -1161,7 +1168,7 @@
           <a:p>
             <a:fld id="{78C97017-6FC3-485B-9764-EAC9E56C1D49}" type="datetimeFigureOut">
               <a:rPr lang="en-US" smtClean="0"/>
-              <a:t>10/16/2016</a:t>
+              <a:t>10/17/2018</a:t>
             </a:fld>
             <a:endParaRPr lang="en-US"/>
           </a:p>
@@ -1264,10 +1271,9 @@
           </a:lstStyle>
           <a:p>
             <a:r>
-              <a:rPr lang="en-US" smtClean="0"/>
+              <a:rPr lang="en-US"/>
               <a:t>Click to edit Master title style</a:t>
             </a:r>
-            <a:endParaRPr lang="en-US"/>
           </a:p>
         </p:txBody>
       </p:sp>
@@ -1384,7 +1390,7 @@
           <a:p>
             <a:pPr lvl="0"/>
             <a:r>
-              <a:rPr lang="en-US" smtClean="0"/>
+              <a:rPr lang="en-US"/>
               <a:t>Click to edit Master text styles</a:t>
             </a:r>
           </a:p>
@@ -1407,7 +1413,7 @@
           <a:p>
             <a:fld id="{78C97017-6FC3-485B-9764-EAC9E56C1D49}" type="datetimeFigureOut">
               <a:rPr lang="en-US" smtClean="0"/>
-              <a:t>10/16/2016</a:t>
+              <a:t>10/17/2018</a:t>
             </a:fld>
             <a:endParaRPr lang="en-US"/>
           </a:p>
@@ -1501,10 +1507,9 @@
           <a:lstStyle/>
           <a:p>
             <a:r>
-              <a:rPr lang="en-US" smtClean="0"/>
+              <a:rPr lang="en-US"/>
               <a:t>Click to edit Master title style</a:t>
             </a:r>
-            <a:endParaRPr lang="en-US"/>
           </a:p>
         </p:txBody>
       </p:sp>
@@ -1558,38 +1563,37 @@
           <a:p>
             <a:pPr lvl="0"/>
             <a:r>
-              <a:rPr lang="en-US" smtClean="0"/>
+              <a:rPr lang="en-US"/>
               <a:t>Click to edit Master text styles</a:t>
             </a:r>
           </a:p>
           <a:p>
             <a:pPr lvl="1"/>
             <a:r>
-              <a:rPr lang="en-US" smtClean="0"/>
+              <a:rPr lang="en-US"/>
               <a:t>Second level</a:t>
             </a:r>
           </a:p>
           <a:p>
             <a:pPr lvl="2"/>
             <a:r>
-              <a:rPr lang="en-US" smtClean="0"/>
+              <a:rPr lang="en-US"/>
               <a:t>Third level</a:t>
             </a:r>
           </a:p>
           <a:p>
             <a:pPr lvl="3"/>
             <a:r>
-              <a:rPr lang="en-US" smtClean="0"/>
+              <a:rPr lang="en-US"/>
               <a:t>Fourth level</a:t>
             </a:r>
           </a:p>
           <a:p>
             <a:pPr lvl="4"/>
             <a:r>
-              <a:rPr lang="en-US" smtClean="0"/>
+              <a:rPr lang="en-US"/>
               <a:t>Fifth level</a:t>
             </a:r>
-            <a:endParaRPr lang="en-US"/>
           </a:p>
         </p:txBody>
       </p:sp>
@@ -1643,38 +1647,37 @@
           <a:p>
             <a:pPr lvl="0"/>
             <a:r>
-              <a:rPr lang="en-US" smtClean="0"/>
+              <a:rPr lang="en-US"/>
               <a:t>Click to edit Master text styles</a:t>
             </a:r>
           </a:p>
           <a:p>
             <a:pPr lvl="1"/>
             <a:r>
-              <a:rPr lang="en-US" smtClean="0"/>
+              <a:rPr lang="en-US"/>
               <a:t>Second level</a:t>
             </a:r>
           </a:p>
           <a:p>
             <a:pPr lvl="2"/>
             <a:r>
-              <a:rPr lang="en-US" smtClean="0"/>
+              <a:rPr lang="en-US"/>
               <a:t>Third level</a:t>
             </a:r>
           </a:p>
           <a:p>
             <a:pPr lvl="3"/>
             <a:r>
-              <a:rPr lang="en-US" smtClean="0"/>
+              <a:rPr lang="en-US"/>
               <a:t>Fourth level</a:t>
             </a:r>
           </a:p>
           <a:p>
             <a:pPr lvl="4"/>
             <a:r>
-              <a:rPr lang="en-US" smtClean="0"/>
+              <a:rPr lang="en-US"/>
               <a:t>Fifth level</a:t>
             </a:r>
-            <a:endParaRPr lang="en-US"/>
           </a:p>
         </p:txBody>
       </p:sp>
@@ -1695,7 +1698,7 @@
           <a:p>
             <a:fld id="{78C97017-6FC3-485B-9764-EAC9E56C1D49}" type="datetimeFigureOut">
               <a:rPr lang="en-US" smtClean="0"/>
-              <a:t>10/16/2016</a:t>
+              <a:t>10/17/2018</a:t>
             </a:fld>
             <a:endParaRPr lang="en-US"/>
           </a:p>
@@ -1793,10 +1796,9 @@
           </a:lstStyle>
           <a:p>
             <a:r>
-              <a:rPr lang="en-US" smtClean="0"/>
+              <a:rPr lang="en-US"/>
               <a:t>Click to edit Master title style</a:t>
             </a:r>
-            <a:endParaRPr lang="en-US"/>
           </a:p>
         </p:txBody>
       </p:sp>
@@ -1859,7 +1861,7 @@
           <a:p>
             <a:pPr lvl="0"/>
             <a:r>
-              <a:rPr lang="en-US" smtClean="0"/>
+              <a:rPr lang="en-US"/>
               <a:t>Click to edit Master text styles</a:t>
             </a:r>
           </a:p>
@@ -1915,38 +1917,37 @@
           <a:p>
             <a:pPr lvl="0"/>
             <a:r>
-              <a:rPr lang="en-US" smtClean="0"/>
+              <a:rPr lang="en-US"/>
               <a:t>Click to edit Master text styles</a:t>
             </a:r>
           </a:p>
           <a:p>
             <a:pPr lvl="1"/>
             <a:r>
-              <a:rPr lang="en-US" smtClean="0"/>
+              <a:rPr lang="en-US"/>
               <a:t>Second level</a:t>
             </a:r>
           </a:p>
           <a:p>
             <a:pPr lvl="2"/>
             <a:r>
-              <a:rPr lang="en-US" smtClean="0"/>
+              <a:rPr lang="en-US"/>
               <a:t>Third level</a:t>
             </a:r>
           </a:p>
           <a:p>
             <a:pPr lvl="3"/>
             <a:r>
-              <a:rPr lang="en-US" smtClean="0"/>
+              <a:rPr lang="en-US"/>
               <a:t>Fourth level</a:t>
             </a:r>
           </a:p>
           <a:p>
             <a:pPr lvl="4"/>
             <a:r>
-              <a:rPr lang="en-US" smtClean="0"/>
+              <a:rPr lang="en-US"/>
               <a:t>Fifth level</a:t>
             </a:r>
-            <a:endParaRPr lang="en-US"/>
           </a:p>
         </p:txBody>
       </p:sp>
@@ -2009,7 +2010,7 @@
           <a:p>
             <a:pPr lvl="0"/>
             <a:r>
-              <a:rPr lang="en-US" smtClean="0"/>
+              <a:rPr lang="en-US"/>
               <a:t>Click to edit Master text styles</a:t>
             </a:r>
           </a:p>
@@ -2065,38 +2066,37 @@
           <a:p>
             <a:pPr lvl="0"/>
             <a:r>
-              <a:rPr lang="en-US" smtClean="0"/>
+              <a:rPr lang="en-US"/>
               <a:t>Click to edit Master text styles</a:t>
             </a:r>
           </a:p>
           <a:p>
             <a:pPr lvl="1"/>
             <a:r>
-              <a:rPr lang="en-US" smtClean="0"/>
+              <a:rPr lang="en-US"/>
               <a:t>Second level</a:t>
             </a:r>
           </a:p>
           <a:p>
             <a:pPr lvl="2"/>
             <a:r>
-              <a:rPr lang="en-US" smtClean="0"/>
+              <a:rPr lang="en-US"/>
               <a:t>Third level</a:t>
             </a:r>
           </a:p>
           <a:p>
             <a:pPr lvl="3"/>
             <a:r>
-              <a:rPr lang="en-US" smtClean="0"/>
+              <a:rPr lang="en-US"/>
               <a:t>Fourth level</a:t>
             </a:r>
           </a:p>
           <a:p>
             <a:pPr lvl="4"/>
             <a:r>
-              <a:rPr lang="en-US" smtClean="0"/>
+              <a:rPr lang="en-US"/>
               <a:t>Fifth level</a:t>
             </a:r>
-            <a:endParaRPr lang="en-US"/>
           </a:p>
         </p:txBody>
       </p:sp>
@@ -2117,7 +2117,7 @@
           <a:p>
             <a:fld id="{78C97017-6FC3-485B-9764-EAC9E56C1D49}" type="datetimeFigureOut">
               <a:rPr lang="en-US" smtClean="0"/>
-              <a:t>10/16/2016</a:t>
+              <a:t>10/17/2018</a:t>
             </a:fld>
             <a:endParaRPr lang="en-US"/>
           </a:p>
@@ -2211,10 +2211,9 @@
           <a:lstStyle/>
           <a:p>
             <a:r>
-              <a:rPr lang="en-US" smtClean="0"/>
+              <a:rPr lang="en-US"/>
               <a:t>Click to edit Master title style</a:t>
             </a:r>
-            <a:endParaRPr lang="en-US"/>
           </a:p>
         </p:txBody>
       </p:sp>
@@ -2235,7 +2234,7 @@
           <a:p>
             <a:fld id="{78C97017-6FC3-485B-9764-EAC9E56C1D49}" type="datetimeFigureOut">
               <a:rPr lang="en-US" smtClean="0"/>
-              <a:t>10/16/2016</a:t>
+              <a:t>10/17/2018</a:t>
             </a:fld>
             <a:endParaRPr lang="en-US"/>
           </a:p>
@@ -2330,7 +2329,7 @@
           <a:p>
             <a:fld id="{78C97017-6FC3-485B-9764-EAC9E56C1D49}" type="datetimeFigureOut">
               <a:rPr lang="en-US" smtClean="0"/>
-              <a:t>10/16/2016</a:t>
+              <a:t>10/17/2018</a:t>
             </a:fld>
             <a:endParaRPr lang="en-US"/>
           </a:p>
@@ -2433,10 +2432,9 @@
           </a:lstStyle>
           <a:p>
             <a:r>
-              <a:rPr lang="en-US" smtClean="0"/>
+              <a:rPr lang="en-US"/>
               <a:t>Click to edit Master title style</a:t>
             </a:r>
-            <a:endParaRPr lang="en-US"/>
           </a:p>
         </p:txBody>
       </p:sp>
@@ -2490,38 +2488,37 @@
           <a:p>
             <a:pPr lvl="0"/>
             <a:r>
-              <a:rPr lang="en-US" smtClean="0"/>
+              <a:rPr lang="en-US"/>
               <a:t>Click to edit Master text styles</a:t>
             </a:r>
           </a:p>
           <a:p>
             <a:pPr lvl="1"/>
             <a:r>
-              <a:rPr lang="en-US" smtClean="0"/>
+              <a:rPr lang="en-US"/>
               <a:t>Second level</a:t>
             </a:r>
           </a:p>
           <a:p>
             <a:pPr lvl="2"/>
             <a:r>
-              <a:rPr lang="en-US" smtClean="0"/>
+              <a:rPr lang="en-US"/>
               <a:t>Third level</a:t>
             </a:r>
           </a:p>
           <a:p>
             <a:pPr lvl="3"/>
             <a:r>
-              <a:rPr lang="en-US" smtClean="0"/>
+              <a:rPr lang="en-US"/>
               <a:t>Fourth level</a:t>
             </a:r>
           </a:p>
           <a:p>
             <a:pPr lvl="4"/>
             <a:r>
-              <a:rPr lang="en-US" smtClean="0"/>
+              <a:rPr lang="en-US"/>
               <a:t>Fifth level</a:t>
             </a:r>
-            <a:endParaRPr lang="en-US"/>
           </a:p>
         </p:txBody>
       </p:sp>
@@ -2584,7 +2581,7 @@
           <a:p>
             <a:pPr lvl="0"/>
             <a:r>
-              <a:rPr lang="en-US" smtClean="0"/>
+              <a:rPr lang="en-US"/>
               <a:t>Click to edit Master text styles</a:t>
             </a:r>
           </a:p>
@@ -2607,7 +2604,7 @@
           <a:p>
             <a:fld id="{78C97017-6FC3-485B-9764-EAC9E56C1D49}" type="datetimeFigureOut">
               <a:rPr lang="en-US" smtClean="0"/>
-              <a:t>10/16/2016</a:t>
+              <a:t>10/17/2018</a:t>
             </a:fld>
             <a:endParaRPr lang="en-US"/>
           </a:p>
@@ -2710,10 +2707,9 @@
           </a:lstStyle>
           <a:p>
             <a:r>
-              <a:rPr lang="en-US" smtClean="0"/>
+              <a:rPr lang="en-US"/>
               <a:t>Click to edit Master title style</a:t>
             </a:r>
-            <a:endParaRPr lang="en-US"/>
           </a:p>
         </p:txBody>
       </p:sp>
@@ -2837,7 +2833,7 @@
           <a:p>
             <a:pPr lvl="0"/>
             <a:r>
-              <a:rPr lang="en-US" smtClean="0"/>
+              <a:rPr lang="en-US"/>
               <a:t>Click to edit Master text styles</a:t>
             </a:r>
           </a:p>
@@ -2860,7 +2856,7 @@
           <a:p>
             <a:fld id="{78C97017-6FC3-485B-9764-EAC9E56C1D49}" type="datetimeFigureOut">
               <a:rPr lang="en-US" smtClean="0"/>
-              <a:t>10/16/2016</a:t>
+              <a:t>10/17/2018</a:t>
             </a:fld>
             <a:endParaRPr lang="en-US"/>
           </a:p>
@@ -2969,10 +2965,9 @@
           <a:lstStyle/>
           <a:p>
             <a:r>
-              <a:rPr lang="en-US" smtClean="0"/>
+              <a:rPr lang="en-US"/>
               <a:t>Click to edit Master title style</a:t>
             </a:r>
-            <a:endParaRPr lang="en-US"/>
           </a:p>
         </p:txBody>
       </p:sp>
@@ -3003,38 +2998,37 @@
           <a:p>
             <a:pPr lvl="0"/>
             <a:r>
-              <a:rPr lang="en-US" smtClean="0"/>
+              <a:rPr lang="en-US"/>
               <a:t>Click to edit Master text styles</a:t>
             </a:r>
           </a:p>
           <a:p>
             <a:pPr lvl="1"/>
             <a:r>
-              <a:rPr lang="en-US" smtClean="0"/>
+              <a:rPr lang="en-US"/>
               <a:t>Second level</a:t>
             </a:r>
           </a:p>
           <a:p>
             <a:pPr lvl="2"/>
             <a:r>
-              <a:rPr lang="en-US" smtClean="0"/>
+              <a:rPr lang="en-US"/>
               <a:t>Third level</a:t>
             </a:r>
           </a:p>
           <a:p>
             <a:pPr lvl="3"/>
             <a:r>
-              <a:rPr lang="en-US" smtClean="0"/>
+              <a:rPr lang="en-US"/>
               <a:t>Fourth level</a:t>
             </a:r>
           </a:p>
           <a:p>
             <a:pPr lvl="4"/>
             <a:r>
-              <a:rPr lang="en-US" smtClean="0"/>
+              <a:rPr lang="en-US"/>
               <a:t>Fifth level</a:t>
             </a:r>
-            <a:endParaRPr lang="en-US"/>
           </a:p>
         </p:txBody>
       </p:sp>
@@ -3073,7 +3067,7 @@
           <a:p>
             <a:fld id="{78C97017-6FC3-485B-9764-EAC9E56C1D49}" type="datetimeFigureOut">
               <a:rPr lang="en-US" smtClean="0"/>
-              <a:t>10/16/2016</a:t>
+              <a:t>10/17/2018</a:t>
             </a:fld>
             <a:endParaRPr lang="en-US"/>
           </a:p>
@@ -3494,7 +3488,7 @@
           <a:lstStyle/>
           <a:p>
             <a:r>
-              <a:rPr lang="en-US" sz="1200" b="1" dirty="0" smtClean="0">
+              <a:rPr lang="en-US" sz="1200" b="1" dirty="0">
                 <a:solidFill>
                   <a:schemeClr val="accent6">
                     <a:lumMod val="75000"/>
@@ -3561,7 +3555,7 @@
           <a:p>
             <a:pPr algn="ctr"/>
             <a:r>
-              <a:rPr lang="en-US" sz="1050" dirty="0" smtClean="0">
+              <a:rPr lang="en-US" sz="1050" dirty="0">
                 <a:solidFill>
                   <a:schemeClr val="bg1"/>
                 </a:solidFill>
@@ -3569,19 +3563,19 @@
               <a:t>&lt;&lt;interface&gt;&gt;</a:t>
             </a:r>
             <a:br>
-              <a:rPr lang="en-US" sz="1050" dirty="0" smtClean="0">
+              <a:rPr lang="en-US" sz="1050" dirty="0">
                 <a:solidFill>
                   <a:schemeClr val="bg1"/>
                 </a:solidFill>
               </a:rPr>
             </a:br>
             <a:r>
-              <a:rPr lang="en-US" sz="1050" dirty="0" err="1" smtClean="0">
+              <a:rPr lang="en-US" sz="1050" dirty="0" err="1">
                 <a:solidFill>
                   <a:schemeClr val="bg1"/>
                 </a:solidFill>
               </a:rPr>
-              <a:t>AddressBookStorage</a:t>
+              <a:t>ModuleInfoStorage</a:t>
             </a:r>
             <a:endParaRPr lang="en-SG" sz="1050" dirty="0">
               <a:solidFill>
@@ -3639,7 +3633,7 @@
           <a:p>
             <a:pPr algn="ctr"/>
             <a:r>
-              <a:rPr lang="en-US" sz="1050" dirty="0" err="1" smtClean="0">
+              <a:rPr lang="en-US" sz="1050" dirty="0" err="1">
                 <a:solidFill>
                   <a:schemeClr val="bg1"/>
                 </a:solidFill>
@@ -3713,7 +3707,7 @@
           <a:p>
             <a:pPr algn="ctr"/>
             <a:r>
-              <a:rPr lang="en-US" sz="1050" dirty="0" smtClean="0">
+              <a:rPr lang="en-US" sz="1050" dirty="0">
                 <a:solidFill>
                   <a:schemeClr val="bg1"/>
                 </a:solidFill>
@@ -3967,6 +3961,7 @@
         <p:nvCxnSpPr>
           <p:cNvPr id="97" name="Elbow Connector 63"/>
           <p:cNvCxnSpPr>
+            <a:cxnSpLocks/>
             <a:stCxn id="99" idx="3"/>
             <a:endCxn id="50" idx="1"/>
           </p:cNvCxnSpPr>
@@ -3975,7 +3970,7 @@
         <p:spPr>
           <a:xfrm flipV="1">
             <a:off x="4398041" y="3331820"/>
-            <a:ext cx="223324" cy="1"/>
+            <a:ext cx="223325" cy="1"/>
           </a:xfrm>
           <a:prstGeom prst="bentConnector3">
             <a:avLst>
@@ -4064,52 +4059,6 @@
           </a:p>
         </p:txBody>
       </p:sp>
-      <p:cxnSp>
-        <p:nvCxnSpPr>
-          <p:cNvPr id="124" name="Elbow Connector 122"/>
-          <p:cNvCxnSpPr>
-            <a:stCxn id="50" idx="3"/>
-            <a:endCxn id="66" idx="1"/>
-          </p:cNvCxnSpPr>
-          <p:nvPr/>
-        </p:nvCxnSpPr>
-        <p:spPr>
-          <a:xfrm>
-            <a:off x="5791200" y="3331820"/>
-            <a:ext cx="228600" cy="1970"/>
-          </a:xfrm>
-          <a:prstGeom prst="bentConnector3">
-            <a:avLst>
-              <a:gd name="adj1" fmla="val 50000"/>
-            </a:avLst>
-          </a:prstGeom>
-          <a:ln w="19050">
-            <a:solidFill>
-              <a:schemeClr val="accent6">
-                <a:lumMod val="75000"/>
-              </a:schemeClr>
-            </a:solidFill>
-            <a:prstDash val="sysDot"/>
-            <a:headEnd type="none" w="med" len="med"/>
-            <a:tailEnd type="arrow" w="med" len="med"/>
-          </a:ln>
-          <a:effectLst/>
-        </p:spPr>
-        <p:style>
-          <a:lnRef idx="1">
-            <a:schemeClr val="accent2"/>
-          </a:lnRef>
-          <a:fillRef idx="2">
-            <a:schemeClr val="accent2"/>
-          </a:fillRef>
-          <a:effectRef idx="1">
-            <a:schemeClr val="accent2"/>
-          </a:effectRef>
-          <a:fontRef idx="minor">
-            <a:schemeClr val="dk1"/>
-          </a:fontRef>
-        </p:style>
-      </p:cxnSp>
       <p:sp>
         <p:nvSpPr>
           <p:cNvPr id="50" name="Rectangle 8"/>
@@ -4118,8 +4067,8 @@
         </p:nvSpPr>
         <p:spPr>
           <a:xfrm>
-            <a:off x="4621365" y="3158440"/>
-            <a:ext cx="1169835" cy="346760"/>
+            <a:off x="4621366" y="3158440"/>
+            <a:ext cx="1090398" cy="346760"/>
           </a:xfrm>
           <a:prstGeom prst="rect">
             <a:avLst/>
@@ -4147,43 +4096,14 @@
           <a:p>
             <a:pPr algn="ctr"/>
             <a:r>
-              <a:rPr lang="en-US" sz="1050" b="1" dirty="0" err="1" smtClean="0">
+              <a:rPr lang="en-US" sz="1050" b="1" dirty="0" err="1">
                 <a:solidFill>
                   <a:schemeClr val="accent6">
                     <a:lumMod val="75000"/>
                   </a:schemeClr>
                 </a:solidFill>
               </a:rPr>
-              <a:t>XmlAddressBook</a:t>
-            </a:r>
-            <a:r>
-              <a:rPr lang="en-US" sz="1050" b="1" dirty="0" smtClean="0">
-                <a:solidFill>
-                  <a:schemeClr val="accent6">
-                    <a:lumMod val="75000"/>
-                  </a:schemeClr>
-                </a:solidFill>
-              </a:rPr>
-              <a:t/>
-            </a:r>
-            <a:br>
-              <a:rPr lang="en-US" sz="1050" b="1" dirty="0" smtClean="0">
-                <a:solidFill>
-                  <a:schemeClr val="accent6">
-                    <a:lumMod val="75000"/>
-                  </a:schemeClr>
-                </a:solidFill>
-              </a:rPr>
-            </a:br>
-            <a:r>
-              <a:rPr lang="en-US" sz="1050" b="1" dirty="0" smtClean="0">
-                <a:solidFill>
-                  <a:schemeClr val="accent6">
-                    <a:lumMod val="75000"/>
-                  </a:schemeClr>
-                </a:solidFill>
-              </a:rPr>
-              <a:t>Storage</a:t>
+              <a:t>JsonModuleInfoStorage</a:t>
             </a:r>
             <a:endParaRPr lang="en-SG" sz="1050" b="1" dirty="0">
               <a:solidFill>
@@ -4243,7 +4163,7 @@
           <a:p>
             <a:pPr algn="ctr"/>
             <a:r>
-              <a:rPr lang="en-US" sz="1050" dirty="0" smtClean="0">
+              <a:rPr lang="en-US" sz="1050" dirty="0">
                 <a:solidFill>
                   <a:schemeClr val="bg1"/>
                 </a:solidFill>
@@ -4251,14 +4171,14 @@
               <a:t>&lt;&lt;interface&gt;&gt;</a:t>
             </a:r>
             <a:br>
-              <a:rPr lang="en-US" sz="1050" dirty="0" smtClean="0">
+              <a:rPr lang="en-US" sz="1050" dirty="0">
                 <a:solidFill>
                   <a:schemeClr val="bg1"/>
                 </a:solidFill>
               </a:rPr>
             </a:br>
             <a:r>
-              <a:rPr lang="en-US" sz="1050" dirty="0" err="1" smtClean="0">
+              <a:rPr lang="en-US" sz="1050" dirty="0" err="1">
                 <a:solidFill>
                   <a:schemeClr val="bg1"/>
                 </a:solidFill>
@@ -4516,30 +4436,22 @@
           <a:p>
             <a:pPr algn="ctr"/>
             <a:r>
-              <a:rPr lang="en-US" sz="1050" dirty="0" err="1" smtClean="0">
+              <a:rPr lang="en-US" sz="1050" dirty="0" err="1">
                 <a:solidFill>
                   <a:schemeClr val="bg1"/>
                 </a:solidFill>
               </a:rPr>
               <a:t>JsonUserPrefs</a:t>
             </a:r>
-            <a:r>
-              <a:rPr lang="en-US" sz="1050" dirty="0" smtClean="0">
-                <a:solidFill>
-                  <a:schemeClr val="bg1"/>
-                </a:solidFill>
-              </a:rPr>
-              <a:t/>
-            </a:r>
             <a:br>
-              <a:rPr lang="en-US" sz="1050" dirty="0" smtClean="0">
+              <a:rPr lang="en-US" sz="1050" dirty="0">
                 <a:solidFill>
                   <a:schemeClr val="bg1"/>
                 </a:solidFill>
               </a:rPr>
             </a:br>
             <a:r>
-              <a:rPr lang="en-US" sz="1050" dirty="0" smtClean="0">
+              <a:rPr lang="en-US" sz="1050" dirty="0">
                 <a:solidFill>
                   <a:schemeClr val="bg1"/>
                 </a:solidFill>
@@ -4554,285 +4466,6 @@
           </a:p>
         </p:txBody>
       </p:sp>
-      <p:sp>
-        <p:nvSpPr>
-          <p:cNvPr id="66" name="Rectangle 8"/>
-          <p:cNvSpPr/>
-          <p:nvPr/>
-        </p:nvSpPr>
-        <p:spPr>
-          <a:xfrm>
-            <a:off x="6019800" y="3160410"/>
-            <a:ext cx="1200707" cy="346760"/>
-          </a:xfrm>
-          <a:prstGeom prst="rect">
-            <a:avLst/>
-          </a:prstGeom>
-          <a:ln w="19050"/>
-          <a:effectLst/>
-        </p:spPr>
-        <p:style>
-          <a:lnRef idx="1">
-            <a:schemeClr val="accent6"/>
-          </a:lnRef>
-          <a:fillRef idx="2">
-            <a:schemeClr val="accent6"/>
-          </a:fillRef>
-          <a:effectRef idx="1">
-            <a:schemeClr val="accent6"/>
-          </a:effectRef>
-          <a:fontRef idx="minor">
-            <a:schemeClr val="dk1"/>
-          </a:fontRef>
-        </p:style>
-        <p:txBody>
-          <a:bodyPr rtlCol="0" anchor="ctr"/>
-          <a:lstStyle/>
-          <a:p>
-            <a:pPr algn="ctr"/>
-            <a:r>
-              <a:rPr lang="en-US" sz="1050" b="1" dirty="0" err="1" smtClean="0">
-                <a:solidFill>
-                  <a:schemeClr val="accent6">
-                    <a:lumMod val="75000"/>
-                  </a:schemeClr>
-                </a:solidFill>
-              </a:rPr>
-              <a:t>XmlSerializable</a:t>
-            </a:r>
-            <a:r>
-              <a:rPr lang="en-US" sz="1050" b="1" dirty="0" smtClean="0">
-                <a:solidFill>
-                  <a:schemeClr val="accent6">
-                    <a:lumMod val="75000"/>
-                  </a:schemeClr>
-                </a:solidFill>
-              </a:rPr>
-              <a:t/>
-            </a:r>
-            <a:br>
-              <a:rPr lang="en-US" sz="1050" b="1" dirty="0" smtClean="0">
-                <a:solidFill>
-                  <a:schemeClr val="accent6">
-                    <a:lumMod val="75000"/>
-                  </a:schemeClr>
-                </a:solidFill>
-              </a:rPr>
-            </a:br>
-            <a:r>
-              <a:rPr lang="en-US" sz="1050" b="1" dirty="0" err="1" smtClean="0">
-                <a:solidFill>
-                  <a:schemeClr val="accent6">
-                    <a:lumMod val="75000"/>
-                  </a:schemeClr>
-                </a:solidFill>
-              </a:rPr>
-              <a:t>AddressBook</a:t>
-            </a:r>
-            <a:endParaRPr lang="en-SG" sz="1050" b="1" dirty="0">
-              <a:solidFill>
-                <a:schemeClr val="accent6">
-                  <a:lumMod val="75000"/>
-                </a:schemeClr>
-              </a:solidFill>
-            </a:endParaRPr>
-          </a:p>
-        </p:txBody>
-      </p:sp>
-      <p:cxnSp>
-        <p:nvCxnSpPr>
-          <p:cNvPr id="70" name="Elbow Connector 122"/>
-          <p:cNvCxnSpPr>
-            <a:stCxn id="74" idx="0"/>
-            <a:endCxn id="73" idx="2"/>
-          </p:cNvCxnSpPr>
-          <p:nvPr/>
-        </p:nvCxnSpPr>
-        <p:spPr>
-          <a:xfrm rot="5400000" flipH="1" flipV="1">
-            <a:off x="8077993" y="2992020"/>
-            <a:ext cx="335208" cy="12700"/>
-          </a:xfrm>
-          <a:prstGeom prst="bentConnector3">
-            <a:avLst>
-              <a:gd name="adj1" fmla="val 50000"/>
-            </a:avLst>
-          </a:prstGeom>
-          <a:ln w="19050">
-            <a:prstDash val="sysDot"/>
-            <a:headEnd type="none" w="med" len="med"/>
-            <a:tailEnd type="arrow" w="med" len="med"/>
-          </a:ln>
-          <a:effectLst/>
-        </p:spPr>
-        <p:style>
-          <a:lnRef idx="1">
-            <a:schemeClr val="accent6"/>
-          </a:lnRef>
-          <a:fillRef idx="2">
-            <a:schemeClr val="accent6"/>
-          </a:fillRef>
-          <a:effectRef idx="1">
-            <a:schemeClr val="accent6"/>
-          </a:effectRef>
-          <a:fontRef idx="minor">
-            <a:schemeClr val="dk1"/>
-          </a:fontRef>
-        </p:style>
-      </p:cxnSp>
-      <p:sp>
-        <p:nvSpPr>
-          <p:cNvPr id="73" name="Rectangle 8"/>
-          <p:cNvSpPr/>
-          <p:nvPr/>
-        </p:nvSpPr>
-        <p:spPr>
-          <a:xfrm>
-            <a:off x="7615738" y="2477656"/>
-            <a:ext cx="1259718" cy="346760"/>
-          </a:xfrm>
-          <a:prstGeom prst="rect">
-            <a:avLst/>
-          </a:prstGeom>
-          <a:ln w="19050"/>
-          <a:effectLst/>
-        </p:spPr>
-        <p:style>
-          <a:lnRef idx="1">
-            <a:schemeClr val="accent6"/>
-          </a:lnRef>
-          <a:fillRef idx="2">
-            <a:schemeClr val="accent6"/>
-          </a:fillRef>
-          <a:effectRef idx="1">
-            <a:schemeClr val="accent6"/>
-          </a:effectRef>
-          <a:fontRef idx="minor">
-            <a:schemeClr val="dk1"/>
-          </a:fontRef>
-        </p:style>
-        <p:txBody>
-          <a:bodyPr rtlCol="0" anchor="ctr"/>
-          <a:lstStyle/>
-          <a:p>
-            <a:pPr algn="ctr"/>
-            <a:r>
-              <a:rPr lang="en-US" sz="1050" b="1" dirty="0" err="1" smtClean="0">
-                <a:solidFill>
-                  <a:schemeClr val="accent6">
-                    <a:lumMod val="75000"/>
-                  </a:schemeClr>
-                </a:solidFill>
-              </a:rPr>
-              <a:t>XmlAdaptedTag</a:t>
-            </a:r>
-            <a:endParaRPr lang="en-SG" sz="1050" b="1" dirty="0">
-              <a:solidFill>
-                <a:schemeClr val="accent6">
-                  <a:lumMod val="75000"/>
-                </a:schemeClr>
-              </a:solidFill>
-            </a:endParaRPr>
-          </a:p>
-        </p:txBody>
-      </p:sp>
-      <p:sp>
-        <p:nvSpPr>
-          <p:cNvPr id="74" name="Rectangle 8"/>
-          <p:cNvSpPr/>
-          <p:nvPr/>
-        </p:nvSpPr>
-        <p:spPr>
-          <a:xfrm>
-            <a:off x="7615738" y="3159624"/>
-            <a:ext cx="1259718" cy="346760"/>
-          </a:xfrm>
-          <a:prstGeom prst="rect">
-            <a:avLst/>
-          </a:prstGeom>
-          <a:ln w="19050"/>
-          <a:effectLst/>
-        </p:spPr>
-        <p:style>
-          <a:lnRef idx="1">
-            <a:schemeClr val="accent6"/>
-          </a:lnRef>
-          <a:fillRef idx="2">
-            <a:schemeClr val="accent6"/>
-          </a:fillRef>
-          <a:effectRef idx="1">
-            <a:schemeClr val="accent6"/>
-          </a:effectRef>
-          <a:fontRef idx="minor">
-            <a:schemeClr val="dk1"/>
-          </a:fontRef>
-        </p:style>
-        <p:txBody>
-          <a:bodyPr rtlCol="0" anchor="ctr"/>
-          <a:lstStyle/>
-          <a:p>
-            <a:pPr algn="ctr"/>
-            <a:r>
-              <a:rPr lang="en-US" sz="1050" b="1" dirty="0" err="1" smtClean="0">
-                <a:solidFill>
-                  <a:schemeClr val="accent6">
-                    <a:lumMod val="75000"/>
-                  </a:schemeClr>
-                </a:solidFill>
-              </a:rPr>
-              <a:t>XmlAdaptedPerson</a:t>
-            </a:r>
-            <a:endParaRPr lang="en-SG" sz="1050" b="1" dirty="0">
-              <a:solidFill>
-                <a:schemeClr val="accent6">
-                  <a:lumMod val="75000"/>
-                </a:schemeClr>
-              </a:solidFill>
-            </a:endParaRPr>
-          </a:p>
-        </p:txBody>
-      </p:sp>
-      <p:cxnSp>
-        <p:nvCxnSpPr>
-          <p:cNvPr id="77" name="Elbow Connector 122"/>
-          <p:cNvCxnSpPr>
-            <a:stCxn id="66" idx="3"/>
-            <a:endCxn id="74" idx="1"/>
-          </p:cNvCxnSpPr>
-          <p:nvPr/>
-        </p:nvCxnSpPr>
-        <p:spPr>
-          <a:xfrm flipV="1">
-            <a:off x="7220507" y="3333004"/>
-            <a:ext cx="395231" cy="786"/>
-          </a:xfrm>
-          <a:prstGeom prst="bentConnector3">
-            <a:avLst>
-              <a:gd name="adj1" fmla="val 50000"/>
-            </a:avLst>
-          </a:prstGeom>
-          <a:ln w="19050">
-            <a:prstDash val="sysDot"/>
-            <a:headEnd type="none" w="med" len="med"/>
-            <a:tailEnd type="arrow" w="med" len="med"/>
-          </a:ln>
-          <a:effectLst/>
-        </p:spPr>
-        <p:style>
-          <a:lnRef idx="1">
-            <a:schemeClr val="accent6"/>
-          </a:lnRef>
-          <a:fillRef idx="2">
-            <a:schemeClr val="accent6"/>
-          </a:fillRef>
-          <a:effectRef idx="1">
-            <a:schemeClr val="accent6"/>
-          </a:effectRef>
-          <a:fontRef idx="minor">
-            <a:schemeClr val="dk1"/>
-          </a:fontRef>
-        </p:style>
-      </p:cxnSp>
     </p:spTree>
     <p:extLst>
       <p:ext uri="{BB962C8B-B14F-4D97-AF65-F5344CB8AC3E}">
@@ -4843,13 +4476,6 @@
   <p:clrMapOvr>
     <a:masterClrMapping/>
   </p:clrMapOvr>
-  <p:timing>
-    <p:tnLst>
-      <p:par>
-        <p:cTn id="1" dur="indefinite" restart="never" nodeType="tmRoot"/>
-      </p:par>
-    </p:tnLst>
-  </p:timing>
 </p:sld>
 </file>
 

</xml_diff>

<commit_message>
DeveloperGuide.adoc: Update ModuleInfo and Storage docs
</commit_message>
<xml_diff>
--- a/docs/diagrams/StorageComponentClassDiagram.pptx
+++ b/docs/diagrams/StorageComponentClassDiagram.pptx
@@ -208,7 +208,7 @@
           <a:p>
             <a:fld id="{F5CC4B3F-88C1-4FFA-B1B6-F41C21DC6924}" type="datetimeFigureOut">
               <a:rPr lang="en-US" smtClean="0"/>
-              <a:t>10/17/2018</a:t>
+              <a:t>10/29/2018</a:t>
             </a:fld>
             <a:endParaRPr lang="en-US"/>
           </a:p>
@@ -654,7 +654,7 @@
           <a:p>
             <a:fld id="{78C97017-6FC3-485B-9764-EAC9E56C1D49}" type="datetimeFigureOut">
               <a:rPr lang="en-US" smtClean="0"/>
-              <a:t>10/17/2018</a:t>
+              <a:t>10/29/2018</a:t>
             </a:fld>
             <a:endParaRPr lang="en-US"/>
           </a:p>
@@ -822,7 +822,7 @@
           <a:p>
             <a:fld id="{78C97017-6FC3-485B-9764-EAC9E56C1D49}" type="datetimeFigureOut">
               <a:rPr lang="en-US" smtClean="0"/>
-              <a:t>10/17/2018</a:t>
+              <a:t>10/29/2018</a:t>
             </a:fld>
             <a:endParaRPr lang="en-US"/>
           </a:p>
@@ -1000,7 +1000,7 @@
           <a:p>
             <a:fld id="{78C97017-6FC3-485B-9764-EAC9E56C1D49}" type="datetimeFigureOut">
               <a:rPr lang="en-US" smtClean="0"/>
-              <a:t>10/17/2018</a:t>
+              <a:t>10/29/2018</a:t>
             </a:fld>
             <a:endParaRPr lang="en-US"/>
           </a:p>
@@ -1168,7 +1168,7 @@
           <a:p>
             <a:fld id="{78C97017-6FC3-485B-9764-EAC9E56C1D49}" type="datetimeFigureOut">
               <a:rPr lang="en-US" smtClean="0"/>
-              <a:t>10/17/2018</a:t>
+              <a:t>10/29/2018</a:t>
             </a:fld>
             <a:endParaRPr lang="en-US"/>
           </a:p>
@@ -1413,7 +1413,7 @@
           <a:p>
             <a:fld id="{78C97017-6FC3-485B-9764-EAC9E56C1D49}" type="datetimeFigureOut">
               <a:rPr lang="en-US" smtClean="0"/>
-              <a:t>10/17/2018</a:t>
+              <a:t>10/29/2018</a:t>
             </a:fld>
             <a:endParaRPr lang="en-US"/>
           </a:p>
@@ -1698,7 +1698,7 @@
           <a:p>
             <a:fld id="{78C97017-6FC3-485B-9764-EAC9E56C1D49}" type="datetimeFigureOut">
               <a:rPr lang="en-US" smtClean="0"/>
-              <a:t>10/17/2018</a:t>
+              <a:t>10/29/2018</a:t>
             </a:fld>
             <a:endParaRPr lang="en-US"/>
           </a:p>
@@ -2117,7 +2117,7 @@
           <a:p>
             <a:fld id="{78C97017-6FC3-485B-9764-EAC9E56C1D49}" type="datetimeFigureOut">
               <a:rPr lang="en-US" smtClean="0"/>
-              <a:t>10/17/2018</a:t>
+              <a:t>10/29/2018</a:t>
             </a:fld>
             <a:endParaRPr lang="en-US"/>
           </a:p>
@@ -2234,7 +2234,7 @@
           <a:p>
             <a:fld id="{78C97017-6FC3-485B-9764-EAC9E56C1D49}" type="datetimeFigureOut">
               <a:rPr lang="en-US" smtClean="0"/>
-              <a:t>10/17/2018</a:t>
+              <a:t>10/29/2018</a:t>
             </a:fld>
             <a:endParaRPr lang="en-US"/>
           </a:p>
@@ -2329,7 +2329,7 @@
           <a:p>
             <a:fld id="{78C97017-6FC3-485B-9764-EAC9E56C1D49}" type="datetimeFigureOut">
               <a:rPr lang="en-US" smtClean="0"/>
-              <a:t>10/17/2018</a:t>
+              <a:t>10/29/2018</a:t>
             </a:fld>
             <a:endParaRPr lang="en-US"/>
           </a:p>
@@ -2604,7 +2604,7 @@
           <a:p>
             <a:fld id="{78C97017-6FC3-485B-9764-EAC9E56C1D49}" type="datetimeFigureOut">
               <a:rPr lang="en-US" smtClean="0"/>
-              <a:t>10/17/2018</a:t>
+              <a:t>10/29/2018</a:t>
             </a:fld>
             <a:endParaRPr lang="en-US"/>
           </a:p>
@@ -2856,7 +2856,7 @@
           <a:p>
             <a:fld id="{78C97017-6FC3-485B-9764-EAC9E56C1D49}" type="datetimeFigureOut">
               <a:rPr lang="en-US" smtClean="0"/>
-              <a:t>10/17/2018</a:t>
+              <a:t>10/29/2018</a:t>
             </a:fld>
             <a:endParaRPr lang="en-US"/>
           </a:p>
@@ -3067,7 +3067,7 @@
           <a:p>
             <a:fld id="{78C97017-6FC3-485B-9764-EAC9E56C1D49}" type="datetimeFigureOut">
               <a:rPr lang="en-US" smtClean="0"/>
-              <a:t>10/17/2018</a:t>
+              <a:t>10/29/2018</a:t>
             </a:fld>
             <a:endParaRPr lang="en-US"/>
           </a:p>
@@ -3451,7 +3451,7 @@
         <p:spPr>
           <a:xfrm>
             <a:off x="1119865" y="2086382"/>
-            <a:ext cx="4899935" cy="1723618"/>
+            <a:ext cx="7947935" cy="1723618"/>
           </a:xfrm>
           <a:prstGeom prst="roundRect">
             <a:avLst>
@@ -3516,7 +3516,7 @@
         <p:spPr>
           <a:xfrm>
             <a:off x="2877180" y="3158440"/>
-            <a:ext cx="1323049" cy="346760"/>
+            <a:ext cx="1443447" cy="346760"/>
           </a:xfrm>
           <a:prstGeom prst="rect">
             <a:avLst/>
@@ -3575,7 +3575,7 @@
                   <a:schemeClr val="bg1"/>
                 </a:solidFill>
               </a:rPr>
-              <a:t>ModuleInfoStorage</a:t>
+              <a:t>ModulePlannerStorage</a:t>
             </a:r>
             <a:endParaRPr lang="en-SG" sz="1050" dirty="0">
               <a:solidFill>
@@ -3781,6 +3781,7 @@
         <p:nvCxnSpPr>
           <p:cNvPr id="58" name="Straight Arrow Connector 57"/>
           <p:cNvCxnSpPr>
+            <a:cxnSpLocks/>
             <a:stCxn id="42" idx="3"/>
             <a:endCxn id="2" idx="1"/>
           </p:cNvCxnSpPr>
@@ -3823,9 +3824,7 @@
       <p:cxnSp>
         <p:nvCxnSpPr>
           <p:cNvPr id="75" name="Elbow Connector 122"/>
-          <p:cNvCxnSpPr>
-            <a:cxnSpLocks/>
-          </p:cNvCxnSpPr>
+          <p:cNvCxnSpPr/>
           <p:nvPr/>
         </p:nvCxnSpPr>
         <p:spPr>
@@ -3970,9 +3969,9 @@
           <p:nvPr/>
         </p:nvCxnSpPr>
         <p:spPr>
-          <a:xfrm flipV="1">
-            <a:off x="4398041" y="3331820"/>
-            <a:ext cx="223325" cy="1"/>
+          <a:xfrm>
+            <a:off x="4511665" y="3333005"/>
+            <a:ext cx="307843" cy="27597"/>
           </a:xfrm>
           <a:prstGeom prst="bentConnector3">
             <a:avLst>
@@ -4014,7 +4013,7 @@
         </p:nvSpPr>
         <p:spPr>
           <a:xfrm rot="5400000" flipV="1">
-            <a:off x="4175027" y="3244059"/>
+            <a:off x="4288651" y="3245243"/>
             <a:ext cx="270504" cy="175523"/>
           </a:xfrm>
           <a:prstGeom prst="triangle">
@@ -4061,6 +4060,53 @@
           </a:p>
         </p:txBody>
       </p:sp>
+      <p:cxnSp>
+        <p:nvCxnSpPr>
+          <p:cNvPr id="124" name="Elbow Connector 122"/>
+          <p:cNvCxnSpPr>
+            <a:cxnSpLocks/>
+            <a:stCxn id="50" idx="3"/>
+            <a:endCxn id="66" idx="1"/>
+          </p:cNvCxnSpPr>
+          <p:nvPr/>
+        </p:nvCxnSpPr>
+        <p:spPr>
+          <a:xfrm flipV="1">
+            <a:off x="6142557" y="3348685"/>
+            <a:ext cx="197812" cy="11917"/>
+          </a:xfrm>
+          <a:prstGeom prst="bentConnector3">
+            <a:avLst>
+              <a:gd name="adj1" fmla="val 50000"/>
+            </a:avLst>
+          </a:prstGeom>
+          <a:ln w="19050">
+            <a:solidFill>
+              <a:schemeClr val="accent6">
+                <a:lumMod val="75000"/>
+              </a:schemeClr>
+            </a:solidFill>
+            <a:prstDash val="sysDot"/>
+            <a:headEnd type="none" w="med" len="med"/>
+            <a:tailEnd type="arrow" w="med" len="med"/>
+          </a:ln>
+          <a:effectLst/>
+        </p:spPr>
+        <p:style>
+          <a:lnRef idx="1">
+            <a:schemeClr val="accent2"/>
+          </a:lnRef>
+          <a:fillRef idx="2">
+            <a:schemeClr val="accent2"/>
+          </a:fillRef>
+          <a:effectRef idx="1">
+            <a:schemeClr val="accent2"/>
+          </a:effectRef>
+          <a:fontRef idx="minor">
+            <a:schemeClr val="dk1"/>
+          </a:fontRef>
+        </p:style>
+      </p:cxnSp>
       <p:sp>
         <p:nvSpPr>
           <p:cNvPr id="50" name="Rectangle 8"/>
@@ -4069,8 +4115,8 @@
         </p:nvSpPr>
         <p:spPr>
           <a:xfrm>
-            <a:off x="4621366" y="3158440"/>
-            <a:ext cx="1090398" cy="346760"/>
+            <a:off x="4819508" y="3187222"/>
+            <a:ext cx="1323049" cy="346760"/>
           </a:xfrm>
           <a:prstGeom prst="rect">
             <a:avLst/>
@@ -4105,7 +4151,26 @@
                   </a:schemeClr>
                 </a:solidFill>
               </a:rPr>
-              <a:t>JsonModuleInfoStorage</a:t>
+              <a:t>JsonModulePlanner</a:t>
+            </a:r>
+            <a:br>
+              <a:rPr lang="en-US" sz="1050" b="1" dirty="0">
+                <a:solidFill>
+                  <a:schemeClr val="accent6">
+                    <a:lumMod val="75000"/>
+                  </a:schemeClr>
+                </a:solidFill>
+              </a:rPr>
+            </a:br>
+            <a:r>
+              <a:rPr lang="en-US" sz="1050" b="1" dirty="0">
+                <a:solidFill>
+                  <a:schemeClr val="accent6">
+                    <a:lumMod val="75000"/>
+                  </a:schemeClr>
+                </a:solidFill>
+              </a:rPr>
+              <a:t>Storage</a:t>
             </a:r>
             <a:endParaRPr lang="en-SG" sz="1050" b="1" dirty="0">
               <a:solidFill>
@@ -4468,6 +4533,317 @@
           </a:p>
         </p:txBody>
       </p:sp>
+      <p:sp>
+        <p:nvSpPr>
+          <p:cNvPr id="66" name="Rectangle 8"/>
+          <p:cNvSpPr/>
+          <p:nvPr/>
+        </p:nvSpPr>
+        <p:spPr>
+          <a:xfrm>
+            <a:off x="6340369" y="3175305"/>
+            <a:ext cx="1200707" cy="346760"/>
+          </a:xfrm>
+          <a:prstGeom prst="rect">
+            <a:avLst/>
+          </a:prstGeom>
+          <a:ln w="19050"/>
+          <a:effectLst/>
+        </p:spPr>
+        <p:style>
+          <a:lnRef idx="1">
+            <a:schemeClr val="accent6"/>
+          </a:lnRef>
+          <a:fillRef idx="2">
+            <a:schemeClr val="accent6"/>
+          </a:fillRef>
+          <a:effectRef idx="1">
+            <a:schemeClr val="accent6"/>
+          </a:effectRef>
+          <a:fontRef idx="minor">
+            <a:schemeClr val="dk1"/>
+          </a:fontRef>
+        </p:style>
+        <p:txBody>
+          <a:bodyPr rtlCol="0" anchor="ctr"/>
+          <a:lstStyle/>
+          <a:p>
+            <a:pPr algn="ctr"/>
+            <a:r>
+              <a:rPr lang="en-US" sz="1050" b="1" dirty="0" err="1">
+                <a:solidFill>
+                  <a:schemeClr val="accent6">
+                    <a:lumMod val="75000"/>
+                  </a:schemeClr>
+                </a:solidFill>
+              </a:rPr>
+              <a:t>JsonSerializable</a:t>
+            </a:r>
+            <a:br>
+              <a:rPr lang="en-US" sz="1050" b="1" dirty="0">
+                <a:solidFill>
+                  <a:schemeClr val="accent6">
+                    <a:lumMod val="75000"/>
+                  </a:schemeClr>
+                </a:solidFill>
+              </a:rPr>
+            </a:br>
+            <a:r>
+              <a:rPr lang="en-US" sz="1050" b="1" dirty="0" err="1">
+                <a:solidFill>
+                  <a:schemeClr val="accent6">
+                    <a:lumMod val="75000"/>
+                  </a:schemeClr>
+                </a:solidFill>
+              </a:rPr>
+              <a:t>AddressBook</a:t>
+            </a:r>
+            <a:endParaRPr lang="en-SG" sz="1050" b="1" dirty="0">
+              <a:solidFill>
+                <a:schemeClr val="accent6">
+                  <a:lumMod val="75000"/>
+                </a:schemeClr>
+              </a:solidFill>
+            </a:endParaRPr>
+          </a:p>
+        </p:txBody>
+      </p:sp>
+      <p:cxnSp>
+        <p:nvCxnSpPr>
+          <p:cNvPr id="70" name="Elbow Connector 122"/>
+          <p:cNvCxnSpPr>
+            <a:cxnSpLocks/>
+            <a:stCxn id="74" idx="0"/>
+            <a:endCxn id="73" idx="2"/>
+          </p:cNvCxnSpPr>
+          <p:nvPr/>
+        </p:nvCxnSpPr>
+        <p:spPr>
+          <a:xfrm rot="16200000" flipV="1">
+            <a:off x="8143482" y="2926531"/>
+            <a:ext cx="335208" cy="130977"/>
+          </a:xfrm>
+          <a:prstGeom prst="bentConnector3">
+            <a:avLst>
+              <a:gd name="adj1" fmla="val 50000"/>
+            </a:avLst>
+          </a:prstGeom>
+          <a:ln w="19050">
+            <a:prstDash val="sysDot"/>
+            <a:headEnd type="none" w="med" len="med"/>
+            <a:tailEnd type="arrow" w="med" len="med"/>
+          </a:ln>
+          <a:effectLst/>
+        </p:spPr>
+        <p:style>
+          <a:lnRef idx="1">
+            <a:schemeClr val="accent6"/>
+          </a:lnRef>
+          <a:fillRef idx="2">
+            <a:schemeClr val="accent6"/>
+          </a:fillRef>
+          <a:effectRef idx="1">
+            <a:schemeClr val="accent6"/>
+          </a:effectRef>
+          <a:fontRef idx="minor">
+            <a:schemeClr val="dk1"/>
+          </a:fontRef>
+        </p:style>
+      </p:cxnSp>
+      <p:sp>
+        <p:nvSpPr>
+          <p:cNvPr id="73" name="Rectangle 8"/>
+          <p:cNvSpPr/>
+          <p:nvPr/>
+        </p:nvSpPr>
+        <p:spPr>
+          <a:xfrm>
+            <a:off x="7615738" y="2477656"/>
+            <a:ext cx="1259718" cy="346760"/>
+          </a:xfrm>
+          <a:prstGeom prst="rect">
+            <a:avLst/>
+          </a:prstGeom>
+          <a:ln w="19050"/>
+          <a:effectLst/>
+        </p:spPr>
+        <p:style>
+          <a:lnRef idx="1">
+            <a:schemeClr val="accent6"/>
+          </a:lnRef>
+          <a:fillRef idx="2">
+            <a:schemeClr val="accent6"/>
+          </a:fillRef>
+          <a:effectRef idx="1">
+            <a:schemeClr val="accent6"/>
+          </a:effectRef>
+          <a:fontRef idx="minor">
+            <a:schemeClr val="dk1"/>
+          </a:fontRef>
+        </p:style>
+        <p:txBody>
+          <a:bodyPr rtlCol="0" anchor="ctr"/>
+          <a:lstStyle/>
+          <a:p>
+            <a:pPr algn="ctr"/>
+            <a:r>
+              <a:rPr lang="en-US" sz="1050" b="1" dirty="0" err="1">
+                <a:solidFill>
+                  <a:schemeClr val="accent6">
+                    <a:lumMod val="75000"/>
+                  </a:schemeClr>
+                </a:solidFill>
+              </a:rPr>
+              <a:t>JsonAdapted</a:t>
+            </a:r>
+            <a:endParaRPr lang="en-US" sz="1050" b="1" dirty="0">
+              <a:solidFill>
+                <a:schemeClr val="accent6">
+                  <a:lumMod val="75000"/>
+                </a:schemeClr>
+              </a:solidFill>
+            </a:endParaRPr>
+          </a:p>
+          <a:p>
+            <a:pPr algn="ctr"/>
+            <a:r>
+              <a:rPr lang="en-US" sz="1050" b="1" dirty="0">
+                <a:solidFill>
+                  <a:schemeClr val="accent6">
+                    <a:lumMod val="75000"/>
+                  </a:schemeClr>
+                </a:solidFill>
+              </a:rPr>
+              <a:t>Module</a:t>
+            </a:r>
+            <a:endParaRPr lang="en-SG" sz="1050" b="1" dirty="0">
+              <a:solidFill>
+                <a:schemeClr val="accent6">
+                  <a:lumMod val="75000"/>
+                </a:schemeClr>
+              </a:solidFill>
+            </a:endParaRPr>
+          </a:p>
+        </p:txBody>
+      </p:sp>
+      <p:sp>
+        <p:nvSpPr>
+          <p:cNvPr id="74" name="Rectangle 8"/>
+          <p:cNvSpPr/>
+          <p:nvPr/>
+        </p:nvSpPr>
+        <p:spPr>
+          <a:xfrm>
+            <a:off x="7814361" y="3159624"/>
+            <a:ext cx="1124425" cy="346760"/>
+          </a:xfrm>
+          <a:prstGeom prst="rect">
+            <a:avLst/>
+          </a:prstGeom>
+          <a:ln w="19050"/>
+          <a:effectLst/>
+        </p:spPr>
+        <p:style>
+          <a:lnRef idx="1">
+            <a:schemeClr val="accent6"/>
+          </a:lnRef>
+          <a:fillRef idx="2">
+            <a:schemeClr val="accent6"/>
+          </a:fillRef>
+          <a:effectRef idx="1">
+            <a:schemeClr val="accent6"/>
+          </a:effectRef>
+          <a:fontRef idx="minor">
+            <a:schemeClr val="dk1"/>
+          </a:fontRef>
+        </p:style>
+        <p:txBody>
+          <a:bodyPr rtlCol="0" anchor="ctr"/>
+          <a:lstStyle/>
+          <a:p>
+            <a:pPr algn="ctr"/>
+            <a:r>
+              <a:rPr lang="en-US" sz="1050" b="1" dirty="0" err="1">
+                <a:solidFill>
+                  <a:schemeClr val="accent6">
+                    <a:lumMod val="75000"/>
+                  </a:schemeClr>
+                </a:solidFill>
+              </a:rPr>
+              <a:t>JsonAdapted</a:t>
+            </a:r>
+            <a:endParaRPr lang="en-US" sz="1050" b="1" dirty="0">
+              <a:solidFill>
+                <a:schemeClr val="accent6">
+                  <a:lumMod val="75000"/>
+                </a:schemeClr>
+              </a:solidFill>
+            </a:endParaRPr>
+          </a:p>
+          <a:p>
+            <a:pPr algn="ctr"/>
+            <a:r>
+              <a:rPr lang="en-US" sz="1050" b="1" dirty="0">
+                <a:solidFill>
+                  <a:schemeClr val="accent6">
+                    <a:lumMod val="75000"/>
+                  </a:schemeClr>
+                </a:solidFill>
+              </a:rPr>
+              <a:t>Semester</a:t>
+            </a:r>
+            <a:endParaRPr lang="en-SG" sz="1050" b="1" dirty="0">
+              <a:solidFill>
+                <a:schemeClr val="accent6">
+                  <a:lumMod val="75000"/>
+                </a:schemeClr>
+              </a:solidFill>
+            </a:endParaRPr>
+          </a:p>
+        </p:txBody>
+      </p:sp>
+      <p:cxnSp>
+        <p:nvCxnSpPr>
+          <p:cNvPr id="77" name="Elbow Connector 122"/>
+          <p:cNvCxnSpPr>
+            <a:cxnSpLocks/>
+            <a:stCxn id="66" idx="3"/>
+            <a:endCxn id="74" idx="1"/>
+          </p:cNvCxnSpPr>
+          <p:nvPr/>
+        </p:nvCxnSpPr>
+        <p:spPr>
+          <a:xfrm flipV="1">
+            <a:off x="7541076" y="3333004"/>
+            <a:ext cx="273285" cy="15681"/>
+          </a:xfrm>
+          <a:prstGeom prst="bentConnector3">
+            <a:avLst>
+              <a:gd name="adj1" fmla="val 50000"/>
+            </a:avLst>
+          </a:prstGeom>
+          <a:ln w="19050">
+            <a:prstDash val="sysDot"/>
+            <a:headEnd type="none" w="med" len="med"/>
+            <a:tailEnd type="arrow" w="med" len="med"/>
+          </a:ln>
+          <a:effectLst/>
+        </p:spPr>
+        <p:style>
+          <a:lnRef idx="1">
+            <a:schemeClr val="accent6"/>
+          </a:lnRef>
+          <a:fillRef idx="2">
+            <a:schemeClr val="accent6"/>
+          </a:fillRef>
+          <a:effectRef idx="1">
+            <a:schemeClr val="accent6"/>
+          </a:effectRef>
+          <a:fontRef idx="minor">
+            <a:schemeClr val="dk1"/>
+          </a:fontRef>
+        </p:style>
+      </p:cxnSp>
     </p:spTree>
     <p:extLst>
       <p:ext uri="{BB962C8B-B14F-4D97-AF65-F5344CB8AC3E}">

</xml_diff>

<commit_message>
Tweak wording, add test cases and update storage diagram
</commit_message>
<xml_diff>
--- a/docs/diagrams/StorageComponentClassDiagram.pptx
+++ b/docs/diagrams/StorageComponentClassDiagram.pptx
@@ -208,7 +208,7 @@
           <a:p>
             <a:fld id="{F5CC4B3F-88C1-4FFA-B1B6-F41C21DC6924}" type="datetimeFigureOut">
               <a:rPr lang="en-US" smtClean="0"/>
-              <a:t>11/10/2018</a:t>
+              <a:t>11/12/2018</a:t>
             </a:fld>
             <a:endParaRPr lang="en-US"/>
           </a:p>
@@ -654,7 +654,7 @@
           <a:p>
             <a:fld id="{78C97017-6FC3-485B-9764-EAC9E56C1D49}" type="datetimeFigureOut">
               <a:rPr lang="en-US" smtClean="0"/>
-              <a:t>11/10/2018</a:t>
+              <a:t>11/12/2018</a:t>
             </a:fld>
             <a:endParaRPr lang="en-US"/>
           </a:p>
@@ -822,7 +822,7 @@
           <a:p>
             <a:fld id="{78C97017-6FC3-485B-9764-EAC9E56C1D49}" type="datetimeFigureOut">
               <a:rPr lang="en-US" smtClean="0"/>
-              <a:t>11/10/2018</a:t>
+              <a:t>11/12/2018</a:t>
             </a:fld>
             <a:endParaRPr lang="en-US"/>
           </a:p>
@@ -1000,7 +1000,7 @@
           <a:p>
             <a:fld id="{78C97017-6FC3-485B-9764-EAC9E56C1D49}" type="datetimeFigureOut">
               <a:rPr lang="en-US" smtClean="0"/>
-              <a:t>11/10/2018</a:t>
+              <a:t>11/12/2018</a:t>
             </a:fld>
             <a:endParaRPr lang="en-US"/>
           </a:p>
@@ -1168,7 +1168,7 @@
           <a:p>
             <a:fld id="{78C97017-6FC3-485B-9764-EAC9E56C1D49}" type="datetimeFigureOut">
               <a:rPr lang="en-US" smtClean="0"/>
-              <a:t>11/10/2018</a:t>
+              <a:t>11/12/2018</a:t>
             </a:fld>
             <a:endParaRPr lang="en-US"/>
           </a:p>
@@ -1413,7 +1413,7 @@
           <a:p>
             <a:fld id="{78C97017-6FC3-485B-9764-EAC9E56C1D49}" type="datetimeFigureOut">
               <a:rPr lang="en-US" smtClean="0"/>
-              <a:t>11/10/2018</a:t>
+              <a:t>11/12/2018</a:t>
             </a:fld>
             <a:endParaRPr lang="en-US"/>
           </a:p>
@@ -1698,7 +1698,7 @@
           <a:p>
             <a:fld id="{78C97017-6FC3-485B-9764-EAC9E56C1D49}" type="datetimeFigureOut">
               <a:rPr lang="en-US" smtClean="0"/>
-              <a:t>11/10/2018</a:t>
+              <a:t>11/12/2018</a:t>
             </a:fld>
             <a:endParaRPr lang="en-US"/>
           </a:p>
@@ -2117,7 +2117,7 @@
           <a:p>
             <a:fld id="{78C97017-6FC3-485B-9764-EAC9E56C1D49}" type="datetimeFigureOut">
               <a:rPr lang="en-US" smtClean="0"/>
-              <a:t>11/10/2018</a:t>
+              <a:t>11/12/2018</a:t>
             </a:fld>
             <a:endParaRPr lang="en-US"/>
           </a:p>
@@ -2234,7 +2234,7 @@
           <a:p>
             <a:fld id="{78C97017-6FC3-485B-9764-EAC9E56C1D49}" type="datetimeFigureOut">
               <a:rPr lang="en-US" smtClean="0"/>
-              <a:t>11/10/2018</a:t>
+              <a:t>11/12/2018</a:t>
             </a:fld>
             <a:endParaRPr lang="en-US"/>
           </a:p>
@@ -2329,7 +2329,7 @@
           <a:p>
             <a:fld id="{78C97017-6FC3-485B-9764-EAC9E56C1D49}" type="datetimeFigureOut">
               <a:rPr lang="en-US" smtClean="0"/>
-              <a:t>11/10/2018</a:t>
+              <a:t>11/12/2018</a:t>
             </a:fld>
             <a:endParaRPr lang="en-US"/>
           </a:p>
@@ -2604,7 +2604,7 @@
           <a:p>
             <a:fld id="{78C97017-6FC3-485B-9764-EAC9E56C1D49}" type="datetimeFigureOut">
               <a:rPr lang="en-US" smtClean="0"/>
-              <a:t>11/10/2018</a:t>
+              <a:t>11/12/2018</a:t>
             </a:fld>
             <a:endParaRPr lang="en-US"/>
           </a:p>
@@ -2856,7 +2856,7 @@
           <a:p>
             <a:fld id="{78C97017-6FC3-485B-9764-EAC9E56C1D49}" type="datetimeFigureOut">
               <a:rPr lang="en-US" smtClean="0"/>
-              <a:t>11/10/2018</a:t>
+              <a:t>11/12/2018</a:t>
             </a:fld>
             <a:endParaRPr lang="en-US"/>
           </a:p>
@@ -3067,7 +3067,7 @@
           <a:p>
             <a:fld id="{78C97017-6FC3-485B-9764-EAC9E56C1D49}" type="datetimeFigureOut">
               <a:rPr lang="en-US" smtClean="0"/>
-              <a:t>11/10/2018</a:t>
+              <a:t>11/12/2018</a:t>
             </a:fld>
             <a:endParaRPr lang="en-US"/>
           </a:p>
@@ -4596,7 +4596,7 @@
                   </a:schemeClr>
                 </a:solidFill>
               </a:rPr>
-              <a:t>AddressBook</a:t>
+              <a:t>ModulePlanner</a:t>
             </a:r>
             <a:endParaRPr lang="en-SG" sz="1050" b="1" dirty="0">
               <a:solidFill>

</xml_diff>